<commit_message>
First pass at presentation
</commit_message>
<xml_diff>
--- a/deck/Apache Beam on Amazon Kinesis Data Analytics.pptx
+++ b/deck/Apache Beam on Amazon Kinesis Data Analytics.pptx
@@ -5,10 +5,10 @@
     <p:sldMasterId id="2147483674" r:id="rId4"/>
   </p:sldMasterIdLst>
   <p:notesMasterIdLst>
-    <p:notesMasterId r:id="rId16"/>
+    <p:notesMasterId r:id="rId17"/>
   </p:notesMasterIdLst>
   <p:handoutMasterIdLst>
-    <p:handoutMasterId r:id="rId17"/>
+    <p:handoutMasterId r:id="rId18"/>
   </p:handoutMasterIdLst>
   <p:sldIdLst>
     <p:sldId id="331" r:id="rId5"/>
@@ -20,8 +20,9 @@
     <p:sldId id="300" r:id="rId11"/>
     <p:sldId id="344" r:id="rId12"/>
     <p:sldId id="333" r:id="rId13"/>
-    <p:sldId id="345" r:id="rId14"/>
-    <p:sldId id="346" r:id="rId15"/>
+    <p:sldId id="347" r:id="rId14"/>
+    <p:sldId id="345" r:id="rId15"/>
+    <p:sldId id="346" r:id="rId16"/>
   </p:sldIdLst>
   <p:sldSz cx="14630400" cy="8229600"/>
   <p:notesSz cx="6858000" cy="9144000"/>
@@ -213,7 +214,7 @@
             <a:srgbClr val="A4A3A4"/>
           </p15:clr>
         </p15:guide>
-        <p15:guide id="19" pos="7709" userDrawn="1">
+        <p15:guide id="19" pos="7704" userDrawn="1">
           <p15:clr>
             <a:srgbClr val="A4A3A4"/>
           </p15:clr>
@@ -7486,6 +7487,470 @@
       </p:grpSpPr>
       <p:sp>
         <p:nvSpPr>
+          <p:cNvPr id="2" name="Title 1">
+            <a:extLst>
+              <a:ext uri="{FF2B5EF4-FFF2-40B4-BE49-F238E27FC236}">
+                <a16:creationId xmlns:a16="http://schemas.microsoft.com/office/drawing/2014/main" id="{3E3B6FC8-4431-C642-AE0A-1EAC503EC185}"/>
+              </a:ext>
+            </a:extLst>
+          </p:cNvPr>
+          <p:cNvSpPr>
+            <a:spLocks noGrp="1"/>
+          </p:cNvSpPr>
+          <p:nvPr>
+            <p:ph type="title"/>
+          </p:nvPr>
+        </p:nvSpPr>
+        <p:spPr/>
+        <p:txBody>
+          <a:bodyPr/>
+          <a:lstStyle/>
+          <a:p>
+            <a:r>
+              <a:rPr lang="en-US" dirty="0"/>
+              <a:t>Event time semantics</a:t>
+            </a:r>
+          </a:p>
+        </p:txBody>
+      </p:sp>
+      <p:pic>
+        <p:nvPicPr>
+          <p:cNvPr id="7" name="Picture 2" descr="Overview Beam Architecture">
+            <a:extLst>
+              <a:ext uri="{FF2B5EF4-FFF2-40B4-BE49-F238E27FC236}">
+                <a16:creationId xmlns:a16="http://schemas.microsoft.com/office/drawing/2014/main" id="{0B07719C-1A90-454D-B4C9-02F9FEFEF91C}"/>
+              </a:ext>
+            </a:extLst>
+          </p:cNvPr>
+          <p:cNvPicPr>
+            <a:picLocks noGrp="1" noChangeAspect="1" noChangeArrowheads="1"/>
+          </p:cNvPicPr>
+          <p:nvPr>
+            <p:ph type="pic" sz="quarter" idx="10"/>
+          </p:nvPr>
+        </p:nvPicPr>
+        <p:blipFill rotWithShape="1">
+          <a:blip r:embed="rId2">
+            <a:extLst>
+              <a:ext uri="{28A0092B-C50C-407E-A947-70E740481C1C}">
+                <a14:useLocalDpi xmlns:a14="http://schemas.microsoft.com/office/drawing/2010/main" val="0"/>
+              </a:ext>
+            </a:extLst>
+          </a:blip>
+          <a:srcRect l="-9309" t="-61" r="53521" b="50"/>
+          <a:stretch/>
+        </p:blipFill>
+        <p:spPr bwMode="auto">
+          <a:xfrm>
+            <a:off x="-537936" y="2328122"/>
+            <a:ext cx="7315200" cy="5029200"/>
+          </a:xfrm>
+          <a:prstGeom prst="rect">
+            <a:avLst/>
+          </a:prstGeom>
+          <a:noFill/>
+          <a:extLst>
+            <a:ext uri="{909E8E84-426E-40DD-AFC4-6F175D3DCCD1}">
+              <a14:hiddenFill xmlns:a14="http://schemas.microsoft.com/office/drawing/2010/main">
+                <a:solidFill>
+                  <a:srgbClr val="FFFFFF"/>
+                </a:solidFill>
+              </a14:hiddenFill>
+            </a:ext>
+          </a:extLst>
+        </p:spPr>
+      </p:pic>
+      <p:pic>
+        <p:nvPicPr>
+          <p:cNvPr id="8" name="Graphic 10">
+            <a:extLst>
+              <a:ext uri="{FF2B5EF4-FFF2-40B4-BE49-F238E27FC236}">
+                <a16:creationId xmlns:a16="http://schemas.microsoft.com/office/drawing/2014/main" id="{B6F427B0-E84C-4E41-BA7B-72DCE11F0C5C}"/>
+              </a:ext>
+            </a:extLst>
+          </p:cNvPr>
+          <p:cNvPicPr>
+            <a:picLocks noChangeAspect="1" noChangeArrowheads="1"/>
+          </p:cNvPicPr>
+          <p:nvPr/>
+        </p:nvPicPr>
+        <p:blipFill>
+          <a:blip r:embed="rId3">
+            <a:extLst>
+              <a:ext uri="{28A0092B-C50C-407E-A947-70E740481C1C}">
+                <a14:useLocalDpi xmlns:a14="http://schemas.microsoft.com/office/drawing/2010/main" val="0"/>
+              </a:ext>
+            </a:extLst>
+          </a:blip>
+          <a:srcRect/>
+          <a:stretch>
+            <a:fillRect/>
+          </a:stretch>
+        </p:blipFill>
+        <p:spPr bwMode="auto">
+          <a:xfrm>
+            <a:off x="4313810" y="4232884"/>
+            <a:ext cx="578995" cy="578995"/>
+          </a:xfrm>
+          <a:prstGeom prst="rect">
+            <a:avLst/>
+          </a:prstGeom>
+          <a:noFill/>
+          <a:ln>
+            <a:noFill/>
+          </a:ln>
+          <a:extLst>
+            <a:ext uri="{909E8E84-426E-40DD-AFC4-6F175D3DCCD1}">
+              <a14:hiddenFill xmlns:a14="http://schemas.microsoft.com/office/drawing/2010/main">
+                <a:solidFill>
+                  <a:srgbClr val="FFFFFF"/>
+                </a:solidFill>
+              </a14:hiddenFill>
+            </a:ext>
+            <a:ext uri="{91240B29-F687-4F45-9708-019B960494DF}">
+              <a14:hiddenLine xmlns:a14="http://schemas.microsoft.com/office/drawing/2010/main" w="9525">
+                <a:solidFill>
+                  <a:srgbClr val="000000"/>
+                </a:solidFill>
+                <a:miter lim="800000"/>
+                <a:headEnd/>
+                <a:tailEnd/>
+              </a14:hiddenLine>
+            </a:ext>
+          </a:extLst>
+        </p:spPr>
+      </p:pic>
+      <p:sp>
+        <p:nvSpPr>
+          <p:cNvPr id="9" name="TextBox 20">
+            <a:extLst>
+              <a:ext uri="{FF2B5EF4-FFF2-40B4-BE49-F238E27FC236}">
+                <a16:creationId xmlns:a16="http://schemas.microsoft.com/office/drawing/2014/main" id="{687EF374-EA76-E64A-A753-208FBF55068E}"/>
+              </a:ext>
+            </a:extLst>
+          </p:cNvPr>
+          <p:cNvSpPr txBox="1">
+            <a:spLocks noChangeArrowheads="1"/>
+          </p:cNvSpPr>
+          <p:nvPr/>
+        </p:nvSpPr>
+        <p:spPr bwMode="auto">
+          <a:xfrm>
+            <a:off x="4812032" y="4174880"/>
+            <a:ext cx="1713355" cy="646331"/>
+          </a:xfrm>
+          <a:prstGeom prst="rect">
+            <a:avLst/>
+          </a:prstGeom>
+          <a:noFill/>
+          <a:ln>
+            <a:noFill/>
+          </a:ln>
+          <a:extLst>
+            <a:ext uri="{909E8E84-426E-40DD-AFC4-6F175D3DCCD1}">
+              <a14:hiddenFill xmlns:a14="http://schemas.microsoft.com/office/drawing/2010/main">
+                <a:solidFill>
+                  <a:srgbClr val="FFFFFF"/>
+                </a:solidFill>
+              </a14:hiddenFill>
+            </a:ext>
+            <a:ext uri="{91240B29-F687-4F45-9708-019B960494DF}">
+              <a14:hiddenLine xmlns:a14="http://schemas.microsoft.com/office/drawing/2010/main" w="9525">
+                <a:solidFill>
+                  <a:srgbClr val="000000"/>
+                </a:solidFill>
+                <a:miter lim="800000"/>
+                <a:headEnd/>
+                <a:tailEnd/>
+              </a14:hiddenLine>
+            </a:ext>
+          </a:extLst>
+        </p:spPr>
+        <p:txBody>
+          <a:bodyPr wrap="square">
+            <a:spAutoFit/>
+          </a:bodyPr>
+          <a:lstStyle>
+            <a:lvl1pPr>
+              <a:defRPr>
+                <a:solidFill>
+                  <a:schemeClr val="tx1"/>
+                </a:solidFill>
+                <a:latin typeface="Calibri" panose="020F0502020204030204" pitchFamily="34" charset="0"/>
+              </a:defRPr>
+            </a:lvl1pPr>
+            <a:lvl2pPr marL="742950" indent="-285750">
+              <a:defRPr>
+                <a:solidFill>
+                  <a:schemeClr val="tx1"/>
+                </a:solidFill>
+                <a:latin typeface="Calibri" panose="020F0502020204030204" pitchFamily="34" charset="0"/>
+              </a:defRPr>
+            </a:lvl2pPr>
+            <a:lvl3pPr marL="1143000" indent="-228600">
+              <a:defRPr>
+                <a:solidFill>
+                  <a:schemeClr val="tx1"/>
+                </a:solidFill>
+                <a:latin typeface="Calibri" panose="020F0502020204030204" pitchFamily="34" charset="0"/>
+              </a:defRPr>
+            </a:lvl3pPr>
+            <a:lvl4pPr marL="1600200" indent="-228600">
+              <a:defRPr>
+                <a:solidFill>
+                  <a:schemeClr val="tx1"/>
+                </a:solidFill>
+                <a:latin typeface="Calibri" panose="020F0502020204030204" pitchFamily="34" charset="0"/>
+              </a:defRPr>
+            </a:lvl4pPr>
+            <a:lvl5pPr marL="2057400" indent="-228600">
+              <a:defRPr>
+                <a:solidFill>
+                  <a:schemeClr val="tx1"/>
+                </a:solidFill>
+                <a:latin typeface="Calibri" panose="020F0502020204030204" pitchFamily="34" charset="0"/>
+              </a:defRPr>
+            </a:lvl5pPr>
+            <a:lvl6pPr marL="2514600" indent="-228600" eaLnBrk="0" fontAlgn="base" hangingPunct="0">
+              <a:spcBef>
+                <a:spcPct val="0"/>
+              </a:spcBef>
+              <a:spcAft>
+                <a:spcPct val="0"/>
+              </a:spcAft>
+              <a:defRPr>
+                <a:solidFill>
+                  <a:schemeClr val="tx1"/>
+                </a:solidFill>
+                <a:latin typeface="Calibri" panose="020F0502020204030204" pitchFamily="34" charset="0"/>
+              </a:defRPr>
+            </a:lvl6pPr>
+            <a:lvl7pPr marL="2971800" indent="-228600" eaLnBrk="0" fontAlgn="base" hangingPunct="0">
+              <a:spcBef>
+                <a:spcPct val="0"/>
+              </a:spcBef>
+              <a:spcAft>
+                <a:spcPct val="0"/>
+              </a:spcAft>
+              <a:defRPr>
+                <a:solidFill>
+                  <a:schemeClr val="tx1"/>
+                </a:solidFill>
+                <a:latin typeface="Calibri" panose="020F0502020204030204" pitchFamily="34" charset="0"/>
+              </a:defRPr>
+            </a:lvl7pPr>
+            <a:lvl8pPr marL="3429000" indent="-228600" eaLnBrk="0" fontAlgn="base" hangingPunct="0">
+              <a:spcBef>
+                <a:spcPct val="0"/>
+              </a:spcBef>
+              <a:spcAft>
+                <a:spcPct val="0"/>
+              </a:spcAft>
+              <a:defRPr>
+                <a:solidFill>
+                  <a:schemeClr val="tx1"/>
+                </a:solidFill>
+                <a:latin typeface="Calibri" panose="020F0502020204030204" pitchFamily="34" charset="0"/>
+              </a:defRPr>
+            </a:lvl8pPr>
+            <a:lvl9pPr marL="3886200" indent="-228600" eaLnBrk="0" fontAlgn="base" hangingPunct="0">
+              <a:spcBef>
+                <a:spcPct val="0"/>
+              </a:spcBef>
+              <a:spcAft>
+                <a:spcPct val="0"/>
+              </a:spcAft>
+              <a:defRPr>
+                <a:solidFill>
+                  <a:schemeClr val="tx1"/>
+                </a:solidFill>
+                <a:latin typeface="Calibri" panose="020F0502020204030204" pitchFamily="34" charset="0"/>
+              </a:defRPr>
+            </a:lvl9pPr>
+          </a:lstStyle>
+          <a:p>
+            <a:pPr algn="ctr" eaLnBrk="1" hangingPunct="1"/>
+            <a:r>
+              <a:rPr lang="en-US" altLang="en-US" sz="1200" dirty="0">
+                <a:solidFill>
+                  <a:schemeClr val="bg1"/>
+                </a:solidFill>
+                <a:latin typeface="+mn-lt"/>
+                <a:ea typeface="Amazon Ember" panose="020B0603020204020204" pitchFamily="34" charset="0"/>
+                <a:cs typeface="Arial" panose="020B0604020202020204" pitchFamily="34" charset="0"/>
+              </a:rPr>
+              <a:t>Approximate Arrival Time</a:t>
+            </a:r>
+          </a:p>
+          <a:p>
+            <a:pPr algn="ctr" eaLnBrk="1" hangingPunct="1"/>
+            <a:r>
+              <a:rPr lang="en-US" altLang="en-US" sz="1200" dirty="0">
+                <a:solidFill>
+                  <a:schemeClr val="bg1"/>
+                </a:solidFill>
+                <a:latin typeface="+mn-lt"/>
+                <a:ea typeface="Amazon Ember" panose="020B0603020204020204" pitchFamily="34" charset="0"/>
+                <a:cs typeface="Arial" panose="020B0604020202020204" pitchFamily="34" charset="0"/>
+              </a:rPr>
+              <a:t>Enrichment</a:t>
+            </a:r>
+          </a:p>
+        </p:txBody>
+      </p:sp>
+      <p:sp>
+        <p:nvSpPr>
+          <p:cNvPr id="10" name="TextBox 9">
+            <a:extLst>
+              <a:ext uri="{FF2B5EF4-FFF2-40B4-BE49-F238E27FC236}">
+                <a16:creationId xmlns:a16="http://schemas.microsoft.com/office/drawing/2014/main" id="{39EEDB7C-6FB4-D148-B7D4-8E8969BD18B8}"/>
+              </a:ext>
+            </a:extLst>
+          </p:cNvPr>
+          <p:cNvSpPr txBox="1"/>
+          <p:nvPr/>
+        </p:nvSpPr>
+        <p:spPr>
+          <a:xfrm>
+            <a:off x="7553169" y="2328122"/>
+            <a:ext cx="6505730" cy="4967514"/>
+          </a:xfrm>
+          <a:prstGeom prst="rect">
+            <a:avLst/>
+          </a:prstGeom>
+          <a:noFill/>
+        </p:spPr>
+        <p:txBody>
+          <a:bodyPr wrap="square" rtlCol="0">
+            <a:spAutoFit/>
+          </a:bodyPr>
+          <a:lstStyle/>
+          <a:p>
+            <a:pPr marL="457200" indent="-457200">
+              <a:buFont typeface="Arial" panose="020B0604020202020204" pitchFamily="34" charset="0"/>
+              <a:buChar char="•"/>
+            </a:pPr>
+            <a:r>
+              <a:rPr lang="en-US" dirty="0"/>
+              <a:t>Unify bounded and unbounded  pipeline using the </a:t>
+            </a:r>
+            <a:r>
+              <a:rPr lang="en-US" i="1" dirty="0"/>
+              <a:t>same timestamp</a:t>
+            </a:r>
+          </a:p>
+          <a:p>
+            <a:pPr marL="457200" indent="-457200">
+              <a:buFont typeface="Arial" panose="020B0604020202020204" pitchFamily="34" charset="0"/>
+              <a:buChar char="•"/>
+            </a:pPr>
+            <a:r>
+              <a:rPr lang="en-US" dirty="0"/>
+              <a:t>Each event that is persisted in the Kinesis stream is automatically assigned an </a:t>
+            </a:r>
+            <a:r>
+              <a:rPr lang="en-US" i="1" dirty="0"/>
+              <a:t>approximate arrival timestamp</a:t>
+            </a:r>
+            <a:r>
+              <a:rPr lang="en-US" dirty="0"/>
+              <a:t> in the event meta data.</a:t>
+            </a:r>
+          </a:p>
+          <a:p>
+            <a:pPr marL="457200" indent="-457200">
+              <a:buFont typeface="Arial" panose="020B0604020202020204" pitchFamily="34" charset="0"/>
+              <a:buChar char="•"/>
+            </a:pPr>
+            <a:r>
+              <a:rPr lang="en-US" dirty="0"/>
+              <a:t>The Lambda function is simply adding the </a:t>
+            </a:r>
+            <a:r>
+              <a:rPr lang="en-US" i="1" dirty="0"/>
+              <a:t>approximate arrival timestamp</a:t>
+            </a:r>
+            <a:r>
+              <a:rPr lang="en-US" dirty="0"/>
+              <a:t> from the meta data into the payload of the message when it is written to Amazon S3.</a:t>
+            </a:r>
+            <a:endParaRPr lang="en-US" sz="2900" dirty="0">
+              <a:ea typeface="Amazon Ember" panose="020B0603020204020204" pitchFamily="34" charset="0"/>
+              <a:cs typeface="Amazon Ember" panose="020B0603020204020204" pitchFamily="34" charset="0"/>
+            </a:endParaRPr>
+          </a:p>
+        </p:txBody>
+      </p:sp>
+      <p:sp>
+        <p:nvSpPr>
+          <p:cNvPr id="11" name="TextBox 10">
+            <a:extLst>
+              <a:ext uri="{FF2B5EF4-FFF2-40B4-BE49-F238E27FC236}">
+                <a16:creationId xmlns:a16="http://schemas.microsoft.com/office/drawing/2014/main" id="{E9351B72-68B6-0749-9581-7E7378F92904}"/>
+              </a:ext>
+            </a:extLst>
+          </p:cNvPr>
+          <p:cNvSpPr txBox="1"/>
+          <p:nvPr/>
+        </p:nvSpPr>
+        <p:spPr>
+          <a:xfrm>
+            <a:off x="538861" y="1057084"/>
+            <a:ext cx="13520037" cy="830997"/>
+          </a:xfrm>
+          <a:prstGeom prst="rect">
+            <a:avLst/>
+          </a:prstGeom>
+          <a:noFill/>
+        </p:spPr>
+        <p:txBody>
+          <a:bodyPr wrap="square" rtlCol="0">
+            <a:spAutoFit/>
+          </a:bodyPr>
+          <a:lstStyle/>
+          <a:p>
+            <a:r>
+              <a:rPr lang="en-US" sz="2400" dirty="0">
+                <a:ea typeface="Amazon Ember" panose="020B0603020204020204" pitchFamily="34" charset="0"/>
+                <a:cs typeface="Amazon Ember" panose="020B0603020204020204" pitchFamily="34" charset="0"/>
+              </a:rPr>
+              <a:t>The Apache Flink operators determine the current time by using information from the data itself. Results in computation of deterministic results even when events arrive out of order.</a:t>
+            </a:r>
+          </a:p>
+        </p:txBody>
+      </p:sp>
+    </p:spTree>
+    <p:extLst>
+      <p:ext uri="{BB962C8B-B14F-4D97-AF65-F5344CB8AC3E}">
+        <p14:creationId xmlns:p14="http://schemas.microsoft.com/office/powerpoint/2010/main" val="3750582353"/>
+      </p:ext>
+    </p:extLst>
+  </p:cSld>
+  <p:clrMapOvr>
+    <a:masterClrMapping/>
+  </p:clrMapOvr>
+</p:sld>
+</file>
+
+<file path=ppt/slides/slide11.xml><?xml version="1.0" encoding="utf-8"?>
+<p:sld xmlns:a="http://schemas.openxmlformats.org/drawingml/2006/main" xmlns:r="http://schemas.openxmlformats.org/officeDocument/2006/relationships" xmlns:p="http://schemas.openxmlformats.org/presentationml/2006/main">
+  <p:cSld>
+    <p:spTree>
+      <p:nvGrpSpPr>
+        <p:cNvPr id="1" name=""/>
+        <p:cNvGrpSpPr/>
+        <p:nvPr/>
+      </p:nvGrpSpPr>
+      <p:grpSpPr>
+        <a:xfrm>
+          <a:off x="0" y="0"/>
+          <a:ext cx="0" cy="0"/>
+          <a:chOff x="0" y="0"/>
+          <a:chExt cx="0" cy="0"/>
+        </a:xfrm>
+      </p:grpSpPr>
+      <p:sp>
+        <p:nvSpPr>
           <p:cNvPr id="6" name="Title 5">
             <a:extLst>
               <a:ext uri="{FF2B5EF4-FFF2-40B4-BE49-F238E27FC236}">
@@ -7578,7 +8043,7 @@
 </p:sld>
 </file>
 
-<file path=ppt/slides/slide11.xml><?xml version="1.0" encoding="utf-8"?>
+<file path=ppt/slides/slide12.xml><?xml version="1.0" encoding="utf-8"?>
 <p:sld xmlns:a="http://schemas.openxmlformats.org/drawingml/2006/main" xmlns:r="http://schemas.openxmlformats.org/officeDocument/2006/relationships" xmlns:p="http://schemas.openxmlformats.org/presentationml/2006/main">
   <p:cSld>
     <p:spTree>
@@ -17849,34 +18314,6 @@
       </p:sp>
       <p:sp>
         <p:nvSpPr>
-          <p:cNvPr id="3" name="Title 2">
-            <a:extLst>
-              <a:ext uri="{FF2B5EF4-FFF2-40B4-BE49-F238E27FC236}">
-                <a16:creationId xmlns:a16="http://schemas.microsoft.com/office/drawing/2014/main" id="{6A0DC56A-438E-514E-AFC4-7393A169A674}"/>
-              </a:ext>
-            </a:extLst>
-          </p:cNvPr>
-          <p:cNvSpPr>
-            <a:spLocks noGrp="1"/>
-          </p:cNvSpPr>
-          <p:nvPr>
-            <p:ph type="title"/>
-          </p:nvPr>
-        </p:nvSpPr>
-        <p:spPr/>
-        <p:txBody>
-          <a:bodyPr/>
-          <a:lstStyle/>
-          <a:p>
-            <a:r>
-              <a:rPr lang="en-US" dirty="0"/>
-              <a:t>Analyzing NYC Taxi Trips</a:t>
-            </a:r>
-          </a:p>
-        </p:txBody>
-      </p:sp>
-      <p:sp>
-        <p:nvSpPr>
           <p:cNvPr id="7" name="TextBox 6">
             <a:extLst>
               <a:ext uri="{FF2B5EF4-FFF2-40B4-BE49-F238E27FC236}">
@@ -17948,7 +18385,7 @@
         </p:nvSpPr>
         <p:spPr>
           <a:xfrm>
-            <a:off x="0" y="0"/>
+            <a:off x="-11430" y="0"/>
             <a:ext cx="14630400" cy="8229600"/>
           </a:xfrm>
           <a:prstGeom prst="rect">
@@ -17984,6 +18421,34 @@
           <a:p>
             <a:pPr algn="ctr"/>
             <a:endParaRPr lang="en-US" sz="4608" dirty="0"/>
+          </a:p>
+        </p:txBody>
+      </p:sp>
+      <p:sp>
+        <p:nvSpPr>
+          <p:cNvPr id="3" name="Title 2">
+            <a:extLst>
+              <a:ext uri="{FF2B5EF4-FFF2-40B4-BE49-F238E27FC236}">
+                <a16:creationId xmlns:a16="http://schemas.microsoft.com/office/drawing/2014/main" id="{6A0DC56A-438E-514E-AFC4-7393A169A674}"/>
+              </a:ext>
+            </a:extLst>
+          </p:cNvPr>
+          <p:cNvSpPr>
+            <a:spLocks noGrp="1"/>
+          </p:cNvSpPr>
+          <p:nvPr>
+            <p:ph type="title"/>
+          </p:nvPr>
+        </p:nvSpPr>
+        <p:spPr/>
+        <p:txBody>
+          <a:bodyPr/>
+          <a:lstStyle/>
+          <a:p>
+            <a:r>
+              <a:rPr lang="en-US" dirty="0"/>
+              <a:t>Analyzing NYC Taxi Trips</a:t>
+            </a:r>
           </a:p>
         </p:txBody>
       </p:sp>
@@ -18405,6 +18870,100 @@
         <p:spPr bwMode="auto">
           <a:xfrm>
             <a:off x="8610661" y="1803940"/>
+            <a:ext cx="888892" cy="888892"/>
+          </a:xfrm>
+          <a:prstGeom prst="rect">
+            <a:avLst/>
+          </a:prstGeom>
+          <a:noFill/>
+          <a:extLst>
+            <a:ext uri="{909E8E84-426E-40DD-AFC4-6F175D3DCCD1}">
+              <a14:hiddenFill xmlns:a14="http://schemas.microsoft.com/office/drawing/2010/main">
+                <a:solidFill>
+                  <a:srgbClr val="FFFFFF"/>
+                </a:solidFill>
+              </a14:hiddenFill>
+            </a:ext>
+          </a:extLst>
+        </p:spPr>
+      </p:pic>
+      <p:pic>
+        <p:nvPicPr>
+          <p:cNvPr id="17" name="Picture 4" descr="Apache Flink Logo">
+            <a:extLst>
+              <a:ext uri="{FF2B5EF4-FFF2-40B4-BE49-F238E27FC236}">
+                <a16:creationId xmlns:a16="http://schemas.microsoft.com/office/drawing/2014/main" id="{C8FCB0E2-A2F7-DD46-A347-6D6010BE1850}"/>
+              </a:ext>
+            </a:extLst>
+          </p:cNvPr>
+          <p:cNvPicPr>
+            <a:picLocks noChangeAspect="1" noChangeArrowheads="1"/>
+          </p:cNvPicPr>
+          <p:nvPr/>
+        </p:nvPicPr>
+        <p:blipFill>
+          <a:blip r:embed="rId4">
+            <a:extLst>
+              <a:ext uri="{28A0092B-C50C-407E-A947-70E740481C1C}">
+                <a14:useLocalDpi xmlns:a14="http://schemas.microsoft.com/office/drawing/2010/main" val="0"/>
+              </a:ext>
+            </a:extLst>
+          </a:blip>
+          <a:srcRect/>
+          <a:stretch>
+            <a:fillRect/>
+          </a:stretch>
+        </p:blipFill>
+        <p:spPr bwMode="auto">
+          <a:xfrm>
+            <a:off x="7760824" y="6327641"/>
+            <a:ext cx="888892" cy="888892"/>
+          </a:xfrm>
+          <a:prstGeom prst="rect">
+            <a:avLst/>
+          </a:prstGeom>
+          <a:noFill/>
+          <a:extLst>
+            <a:ext uri="{909E8E84-426E-40DD-AFC4-6F175D3DCCD1}">
+              <a14:hiddenFill xmlns:a14="http://schemas.microsoft.com/office/drawing/2010/main">
+                <a:solidFill>
+                  <a:srgbClr val="FFFFFF"/>
+                </a:solidFill>
+              </a14:hiddenFill>
+            </a:ext>
+          </a:extLst>
+        </p:spPr>
+      </p:pic>
+      <p:pic>
+        <p:nvPicPr>
+          <p:cNvPr id="18" name="Picture 8">
+            <a:extLst>
+              <a:ext uri="{FF2B5EF4-FFF2-40B4-BE49-F238E27FC236}">
+                <a16:creationId xmlns:a16="http://schemas.microsoft.com/office/drawing/2014/main" id="{CEFC0D59-D7EC-8543-A0B0-B9276707062B}"/>
+              </a:ext>
+            </a:extLst>
+          </p:cNvPr>
+          <p:cNvPicPr>
+            <a:picLocks noChangeAspect="1" noChangeArrowheads="1"/>
+          </p:cNvPicPr>
+          <p:nvPr/>
+        </p:nvPicPr>
+        <p:blipFill>
+          <a:blip r:embed="rId5">
+            <a:extLst>
+              <a:ext uri="{28A0092B-C50C-407E-A947-70E740481C1C}">
+                <a14:useLocalDpi xmlns:a14="http://schemas.microsoft.com/office/drawing/2010/main" val="0"/>
+              </a:ext>
+            </a:extLst>
+          </a:blip>
+          <a:srcRect/>
+          <a:stretch>
+            <a:fillRect/>
+          </a:stretch>
+        </p:blipFill>
+        <p:spPr bwMode="auto">
+          <a:xfrm>
+            <a:off x="8718090" y="6327641"/>
             <a:ext cx="888892" cy="888892"/>
           </a:xfrm>
           <a:prstGeom prst="rect">

</xml_diff>

<commit_message>
added a slide on application parameters
</commit_message>
<xml_diff>
--- a/deck/Apache Beam on Amazon Kinesis Data Analytics.pptx
+++ b/deck/Apache Beam on Amazon Kinesis Data Analytics.pptx
@@ -5,10 +5,10 @@
     <p:sldMasterId id="2147483674" r:id="rId4"/>
   </p:sldMasterIdLst>
   <p:notesMasterIdLst>
-    <p:notesMasterId r:id="rId17"/>
+    <p:notesMasterId r:id="rId18"/>
   </p:notesMasterIdLst>
   <p:handoutMasterIdLst>
-    <p:handoutMasterId r:id="rId18"/>
+    <p:handoutMasterId r:id="rId19"/>
   </p:handoutMasterIdLst>
   <p:sldIdLst>
     <p:sldId id="331" r:id="rId5"/>
@@ -21,8 +21,9 @@
     <p:sldId id="344" r:id="rId12"/>
     <p:sldId id="333" r:id="rId13"/>
     <p:sldId id="347" r:id="rId14"/>
-    <p:sldId id="345" r:id="rId15"/>
-    <p:sldId id="346" r:id="rId16"/>
+    <p:sldId id="348" r:id="rId15"/>
+    <p:sldId id="345" r:id="rId16"/>
+    <p:sldId id="346" r:id="rId17"/>
   </p:sldIdLst>
   <p:sldSz cx="14630400" cy="8229600"/>
   <p:notesSz cx="6858000" cy="9144000"/>
@@ -189,7 +190,7 @@
             <a:srgbClr val="A4A3A4"/>
           </p15:clr>
         </p15:guide>
-        <p15:guide id="14" pos="4032" userDrawn="1">
+        <p15:guide id="14" pos="4056" userDrawn="1">
           <p15:clr>
             <a:srgbClr val="A4A3A4"/>
           </p15:clr>
@@ -546,7 +547,7 @@
             <a:fld id="{0B25AC41-3BEC-9247-8322-91B80C013F2D}" type="datetimeFigureOut">
               <a:rPr lang="en-US" smtClean="0"/>
               <a:pPr/>
-              <a:t>7/20/21</a:t>
+              <a:t>7/21/21</a:t>
             </a:fld>
             <a:endParaRPr lang="en-US" dirty="0"/>
           </a:p>
@@ -7951,6 +7952,289 @@
       </p:grpSpPr>
       <p:sp>
         <p:nvSpPr>
+          <p:cNvPr id="7" name="Rectangle 6">
+            <a:extLst>
+              <a:ext uri="{FF2B5EF4-FFF2-40B4-BE49-F238E27FC236}">
+                <a16:creationId xmlns:a16="http://schemas.microsoft.com/office/drawing/2014/main" id="{7332AE3E-ECF8-0C42-B84F-1230CBD55404}"/>
+              </a:ext>
+            </a:extLst>
+          </p:cNvPr>
+          <p:cNvSpPr/>
+          <p:nvPr/>
+        </p:nvSpPr>
+        <p:spPr>
+          <a:xfrm>
+            <a:off x="-11430" y="0"/>
+            <a:ext cx="14630400" cy="8229600"/>
+          </a:xfrm>
+          <a:prstGeom prst="rect">
+            <a:avLst/>
+          </a:prstGeom>
+          <a:solidFill>
+            <a:schemeClr val="bg1">
+              <a:alpha val="0"/>
+            </a:schemeClr>
+          </a:solidFill>
+          <a:ln>
+            <a:noFill/>
+          </a:ln>
+          <a:effectLst/>
+        </p:spPr>
+        <p:style>
+          <a:lnRef idx="1">
+            <a:schemeClr val="accent1"/>
+          </a:lnRef>
+          <a:fillRef idx="3">
+            <a:schemeClr val="accent1"/>
+          </a:fillRef>
+          <a:effectRef idx="2">
+            <a:schemeClr val="accent1"/>
+          </a:effectRef>
+          <a:fontRef idx="minor">
+            <a:schemeClr val="lt1"/>
+          </a:fontRef>
+        </p:style>
+        <p:txBody>
+          <a:bodyPr rtlCol="0" anchor="ctr"/>
+          <a:lstStyle/>
+          <a:p>
+            <a:pPr algn="ctr"/>
+            <a:endParaRPr lang="en-US" sz="4608" dirty="0"/>
+          </a:p>
+        </p:txBody>
+      </p:sp>
+      <p:sp>
+        <p:nvSpPr>
+          <p:cNvPr id="2" name="Title 1">
+            <a:extLst>
+              <a:ext uri="{FF2B5EF4-FFF2-40B4-BE49-F238E27FC236}">
+                <a16:creationId xmlns:a16="http://schemas.microsoft.com/office/drawing/2014/main" id="{10156689-804D-084C-9CFC-3A226DAB62D4}"/>
+              </a:ext>
+            </a:extLst>
+          </p:cNvPr>
+          <p:cNvSpPr>
+            <a:spLocks noGrp="1"/>
+          </p:cNvSpPr>
+          <p:nvPr>
+            <p:ph type="title"/>
+          </p:nvPr>
+        </p:nvSpPr>
+        <p:spPr/>
+        <p:txBody>
+          <a:bodyPr/>
+          <a:lstStyle/>
+          <a:p>
+            <a:r>
+              <a:rPr lang="en-US" dirty="0"/>
+              <a:t>Application parameters</a:t>
+            </a:r>
+          </a:p>
+        </p:txBody>
+      </p:sp>
+      <p:pic>
+        <p:nvPicPr>
+          <p:cNvPr id="5" name="Picture 4">
+            <a:extLst>
+              <a:ext uri="{FF2B5EF4-FFF2-40B4-BE49-F238E27FC236}">
+                <a16:creationId xmlns:a16="http://schemas.microsoft.com/office/drawing/2014/main" id="{8FB30249-9F14-2449-92D0-0C073CDD26A9}"/>
+              </a:ext>
+            </a:extLst>
+          </p:cNvPr>
+          <p:cNvPicPr>
+            <a:picLocks noChangeAspect="1"/>
+          </p:cNvPicPr>
+          <p:nvPr/>
+        </p:nvPicPr>
+        <p:blipFill>
+          <a:blip r:embed="rId2"/>
+          <a:stretch>
+            <a:fillRect/>
+          </a:stretch>
+        </p:blipFill>
+        <p:spPr>
+          <a:xfrm>
+            <a:off x="3758825" y="1289233"/>
+            <a:ext cx="7089890" cy="790107"/>
+          </a:xfrm>
+          <a:prstGeom prst="rect">
+            <a:avLst/>
+          </a:prstGeom>
+        </p:spPr>
+      </p:pic>
+      <p:cxnSp>
+        <p:nvCxnSpPr>
+          <p:cNvPr id="9" name="Straight Arrow Connector 8">
+            <a:extLst>
+              <a:ext uri="{FF2B5EF4-FFF2-40B4-BE49-F238E27FC236}">
+                <a16:creationId xmlns:a16="http://schemas.microsoft.com/office/drawing/2014/main" id="{7E70F35F-E8B1-594B-9927-FD0FF3926333}"/>
+              </a:ext>
+            </a:extLst>
+          </p:cNvPr>
+          <p:cNvCxnSpPr>
+            <a:cxnSpLocks/>
+          </p:cNvCxnSpPr>
+          <p:nvPr/>
+        </p:nvCxnSpPr>
+        <p:spPr>
+          <a:xfrm flipH="1">
+            <a:off x="7315200" y="2079340"/>
+            <a:ext cx="2" cy="678850"/>
+          </a:xfrm>
+          <a:prstGeom prst="straightConnector1">
+            <a:avLst/>
+          </a:prstGeom>
+          <a:ln>
+            <a:tailEnd type="triangle" w="lg" len="lg"/>
+          </a:ln>
+        </p:spPr>
+        <p:style>
+          <a:lnRef idx="3">
+            <a:schemeClr val="accent1"/>
+          </a:lnRef>
+          <a:fillRef idx="0">
+            <a:schemeClr val="accent1"/>
+          </a:fillRef>
+          <a:effectRef idx="2">
+            <a:schemeClr val="accent1"/>
+          </a:effectRef>
+          <a:fontRef idx="minor">
+            <a:schemeClr val="tx1"/>
+          </a:fontRef>
+        </p:style>
+      </p:cxnSp>
+      <p:pic>
+        <p:nvPicPr>
+          <p:cNvPr id="10" name="Picture 9">
+            <a:extLst>
+              <a:ext uri="{FF2B5EF4-FFF2-40B4-BE49-F238E27FC236}">
+                <a16:creationId xmlns:a16="http://schemas.microsoft.com/office/drawing/2014/main" id="{7E213233-3B11-F944-8A88-54B25A428E98}"/>
+              </a:ext>
+            </a:extLst>
+          </p:cNvPr>
+          <p:cNvPicPr>
+            <a:picLocks noChangeAspect="1"/>
+          </p:cNvPicPr>
+          <p:nvPr/>
+        </p:nvPicPr>
+        <p:blipFill>
+          <a:blip r:embed="rId3"/>
+          <a:stretch>
+            <a:fillRect/>
+          </a:stretch>
+        </p:blipFill>
+        <p:spPr>
+          <a:xfrm>
+            <a:off x="2557463" y="5668026"/>
+            <a:ext cx="9613900" cy="1803400"/>
+          </a:xfrm>
+          <a:prstGeom prst="rect">
+            <a:avLst/>
+          </a:prstGeom>
+        </p:spPr>
+      </p:pic>
+      <p:cxnSp>
+        <p:nvCxnSpPr>
+          <p:cNvPr id="11" name="Straight Arrow Connector 10">
+            <a:extLst>
+              <a:ext uri="{FF2B5EF4-FFF2-40B4-BE49-F238E27FC236}">
+                <a16:creationId xmlns:a16="http://schemas.microsoft.com/office/drawing/2014/main" id="{EEA8335B-F74D-2F45-86A0-7B420FDBFC51}"/>
+              </a:ext>
+            </a:extLst>
+          </p:cNvPr>
+          <p:cNvCxnSpPr>
+            <a:cxnSpLocks/>
+          </p:cNvCxnSpPr>
+          <p:nvPr/>
+        </p:nvCxnSpPr>
+        <p:spPr>
+          <a:xfrm>
+            <a:off x="7303770" y="4983337"/>
+            <a:ext cx="0" cy="708329"/>
+          </a:xfrm>
+          <a:prstGeom prst="straightConnector1">
+            <a:avLst/>
+          </a:prstGeom>
+          <a:ln>
+            <a:tailEnd type="triangle" w="lg" len="lg"/>
+          </a:ln>
+        </p:spPr>
+        <p:style>
+          <a:lnRef idx="3">
+            <a:schemeClr val="accent1"/>
+          </a:lnRef>
+          <a:fillRef idx="0">
+            <a:schemeClr val="accent1"/>
+          </a:fillRef>
+          <a:effectRef idx="2">
+            <a:schemeClr val="accent1"/>
+          </a:effectRef>
+          <a:fontRef idx="minor">
+            <a:schemeClr val="tx1"/>
+          </a:fontRef>
+        </p:style>
+      </p:cxnSp>
+      <p:pic>
+        <p:nvPicPr>
+          <p:cNvPr id="13" name="Picture 12">
+            <a:extLst>
+              <a:ext uri="{FF2B5EF4-FFF2-40B4-BE49-F238E27FC236}">
+                <a16:creationId xmlns:a16="http://schemas.microsoft.com/office/drawing/2014/main" id="{2D393D02-44EA-AF48-BC07-171E6D5581AE}"/>
+              </a:ext>
+            </a:extLst>
+          </p:cNvPr>
+          <p:cNvPicPr>
+            <a:picLocks noChangeAspect="1"/>
+          </p:cNvPicPr>
+          <p:nvPr/>
+        </p:nvPicPr>
+        <p:blipFill>
+          <a:blip r:embed="rId4"/>
+          <a:stretch>
+            <a:fillRect/>
+          </a:stretch>
+        </p:blipFill>
+        <p:spPr>
+          <a:xfrm>
+            <a:off x="3270250" y="2743383"/>
+            <a:ext cx="8089900" cy="2260600"/>
+          </a:xfrm>
+          <a:prstGeom prst="rect">
+            <a:avLst/>
+          </a:prstGeom>
+        </p:spPr>
+      </p:pic>
+    </p:spTree>
+    <p:extLst>
+      <p:ext uri="{BB962C8B-B14F-4D97-AF65-F5344CB8AC3E}">
+        <p14:creationId xmlns:p14="http://schemas.microsoft.com/office/powerpoint/2010/main" val="3628500146"/>
+      </p:ext>
+    </p:extLst>
+  </p:cSld>
+  <p:clrMapOvr>
+    <a:masterClrMapping/>
+  </p:clrMapOvr>
+</p:sld>
+</file>
+
+<file path=ppt/slides/slide12.xml><?xml version="1.0" encoding="utf-8"?>
+<p:sld xmlns:a="http://schemas.openxmlformats.org/drawingml/2006/main" xmlns:r="http://schemas.openxmlformats.org/officeDocument/2006/relationships" xmlns:p="http://schemas.openxmlformats.org/presentationml/2006/main">
+  <p:cSld>
+    <p:spTree>
+      <p:nvGrpSpPr>
+        <p:cNvPr id="1" name=""/>
+        <p:cNvGrpSpPr/>
+        <p:nvPr/>
+      </p:nvGrpSpPr>
+      <p:grpSpPr>
+        <a:xfrm>
+          <a:off x="0" y="0"/>
+          <a:ext cx="0" cy="0"/>
+          <a:chOff x="0" y="0"/>
+          <a:chExt cx="0" cy="0"/>
+        </a:xfrm>
+      </p:grpSpPr>
+      <p:sp>
+        <p:nvSpPr>
           <p:cNvPr id="6" name="Title 5">
             <a:extLst>
               <a:ext uri="{FF2B5EF4-FFF2-40B4-BE49-F238E27FC236}">
@@ -8043,7 +8327,7 @@
 </p:sld>
 </file>
 
-<file path=ppt/slides/slide12.xml><?xml version="1.0" encoding="utf-8"?>
+<file path=ppt/slides/slide13.xml><?xml version="1.0" encoding="utf-8"?>
 <p:sld xmlns:a="http://schemas.openxmlformats.org/drawingml/2006/main" xmlns:r="http://schemas.openxmlformats.org/officeDocument/2006/relationships" xmlns:p="http://schemas.openxmlformats.org/presentationml/2006/main">
   <p:cSld>
     <p:spTree>
@@ -19904,6 +20188,12 @@
 </file>
 
 <file path=customXml/item1.xml><?xml version="1.0" encoding="utf-8"?>
+<p:properties xmlns:p="http://schemas.microsoft.com/office/2006/metadata/properties" xmlns:xsi="http://www.w3.org/2001/XMLSchema-instance">
+  <documentManagement/>
+</p:properties>
+</file>
+
+<file path=customXml/item2.xml><?xml version="1.0" encoding="utf-8"?>
 <ct:contentTypeSchema xmlns:ct="http://schemas.microsoft.com/office/2006/metadata/contentType" xmlns:ma="http://schemas.microsoft.com/office/2006/metadata/properties/metaAttributes" ct:_="" ma:_="" ma:contentTypeName="Document" ma:contentTypeID="0x010100D26A3D6C04DFD740953BA1B2B9E62D60" ma:contentTypeVersion="0" ma:contentTypeDescription="Create a new document." ma:contentTypeScope="" ma:versionID="26617cd14cd3af163c0e97ff614e520a">
   <xsd:schema xmlns:xsd="http://www.w3.org/2001/XMLSchema" xmlns:xs="http://www.w3.org/2001/XMLSchema" xmlns:p="http://schemas.microsoft.com/office/2006/metadata/properties" targetNamespace="http://schemas.microsoft.com/office/2006/metadata/properties" ma:root="true" ma:fieldsID="c64490b4aec6201516c3a874156f37b2">
     <xsd:element name="properties">
@@ -20017,12 +20307,6 @@
 </ct:contentTypeSchema>
 </file>
 
-<file path=customXml/item2.xml><?xml version="1.0" encoding="utf-8"?>
-<p:properties xmlns:p="http://schemas.microsoft.com/office/2006/metadata/properties" xmlns:xsi="http://www.w3.org/2001/XMLSchema-instance">
-  <documentManagement/>
-</p:properties>
-</file>
-
 <file path=customXml/item3.xml><?xml version="1.0" encoding="utf-8"?>
 <?mso-contentType ?>
 <FormTemplates xmlns="http://schemas.microsoft.com/sharepoint/v3/contenttype/forms">
@@ -20033,6 +20317,21 @@
 </file>
 
 <file path=customXml/itemProps1.xml><?xml version="1.0" encoding="utf-8"?>
+<ds:datastoreItem xmlns:ds="http://schemas.openxmlformats.org/officeDocument/2006/customXml" ds:itemID="{C597C89A-FD0C-431E-81F6-90225B937683}">
+  <ds:schemaRefs>
+    <ds:schemaRef ds:uri="http://schemas.microsoft.com/office/infopath/2007/PartnerControls"/>
+    <ds:schemaRef ds:uri="http://www.w3.org/XML/1998/namespace"/>
+    <ds:schemaRef ds:uri="http://schemas.microsoft.com/office/2006/documentManagement/types"/>
+    <ds:schemaRef ds:uri="http://purl.org/dc/dcmitype/"/>
+    <ds:schemaRef ds:uri="http://schemas.openxmlformats.org/package/2006/metadata/core-properties"/>
+    <ds:schemaRef ds:uri="http://purl.org/dc/terms/"/>
+    <ds:schemaRef ds:uri="http://schemas.microsoft.com/office/2006/metadata/properties"/>
+    <ds:schemaRef ds:uri="http://purl.org/dc/elements/1.1/"/>
+  </ds:schemaRefs>
+</ds:datastoreItem>
+</file>
+
+<file path=customXml/itemProps2.xml><?xml version="1.0" encoding="utf-8"?>
 <ds:datastoreItem xmlns:ds="http://schemas.openxmlformats.org/officeDocument/2006/customXml" ds:itemID="{51A3258A-222C-4488-825E-7520D001FB75}">
   <ds:schemaRefs>
     <ds:schemaRef ds:uri="http://schemas.microsoft.com/office/2006/metadata/contentType"/>
@@ -20048,21 +20347,6 @@
 </ds:datastoreItem>
 </file>
 
-<file path=customXml/itemProps2.xml><?xml version="1.0" encoding="utf-8"?>
-<ds:datastoreItem xmlns:ds="http://schemas.openxmlformats.org/officeDocument/2006/customXml" ds:itemID="{C597C89A-FD0C-431E-81F6-90225B937683}">
-  <ds:schemaRefs>
-    <ds:schemaRef ds:uri="http://schemas.microsoft.com/office/infopath/2007/PartnerControls"/>
-    <ds:schemaRef ds:uri="http://www.w3.org/XML/1998/namespace"/>
-    <ds:schemaRef ds:uri="http://schemas.microsoft.com/office/2006/documentManagement/types"/>
-    <ds:schemaRef ds:uri="http://purl.org/dc/dcmitype/"/>
-    <ds:schemaRef ds:uri="http://schemas.openxmlformats.org/package/2006/metadata/core-properties"/>
-    <ds:schemaRef ds:uri="http://purl.org/dc/terms/"/>
-    <ds:schemaRef ds:uri="http://schemas.microsoft.com/office/2006/metadata/properties"/>
-    <ds:schemaRef ds:uri="http://purl.org/dc/elements/1.1/"/>
-  </ds:schemaRefs>
-</ds:datastoreItem>
-</file>
-
 <file path=customXml/itemProps3.xml><?xml version="1.0" encoding="utf-8"?>
 <ds:datastoreItem xmlns:ds="http://schemas.openxmlformats.org/officeDocument/2006/customXml" ds:itemID="{705B35A6-8B52-46A5-AE45-B98C6459DC10}">
   <ds:schemaRefs>

</xml_diff>